<commit_message>
feat(java): add pdf sections
</commit_message>
<xml_diff>
--- a/knowledge-sharing/java-and-oop/Java + POO.pptx
+++ b/knowledge-sharing/java-and-oop/Java + POO.pptx
@@ -205,6 +205,150 @@
       </a:defRPr>
     </a:lvl9pPr>
   </p:defaultTextStyle>
+  <p:extLst>
+    <p:ext uri="{521415D9-36F7-43E2-AB2F-B90AF26B5E84}">
+      <p14:sectionLst xmlns:p14="http://schemas.microsoft.com/office/powerpoint/2010/main">
+        <p14:section name="Inicio" id="{6C3AF15B-A4CB-B94C-A638-72E0545C4A70}">
+          <p14:sldIdLst>
+            <p14:sldId id="256"/>
+          </p14:sldIdLst>
+        </p14:section>
+        <p14:section name="Java" id="{9B9F9181-24F9-ED49-B771-8CD60DD051E1}">
+          <p14:sldIdLst>
+            <p14:sldId id="257"/>
+          </p14:sldIdLst>
+        </p14:section>
+        <p14:section name="Diseño de lenguaje" id="{D4A2B33B-BC6A-D746-9A5C-210B77FD04DE}">
+          <p14:sldIdLst>
+            <p14:sldId id="258"/>
+            <p14:sldId id="259"/>
+            <p14:sldId id="261"/>
+            <p14:sldId id="262"/>
+            <p14:sldId id="263"/>
+            <p14:sldId id="264"/>
+            <p14:sldId id="265"/>
+            <p14:sldId id="266"/>
+            <p14:sldId id="267"/>
+            <p14:sldId id="277"/>
+            <p14:sldId id="276"/>
+            <p14:sldId id="270"/>
+            <p14:sldId id="271"/>
+            <p14:sldId id="269"/>
+            <p14:sldId id="268"/>
+            <p14:sldId id="274"/>
+            <p14:sldId id="275"/>
+            <p14:sldId id="278"/>
+            <p14:sldId id="315"/>
+            <p14:sldId id="316"/>
+          </p14:sldIdLst>
+        </p14:section>
+        <p14:section name="Trivia" id="{1F95B6EA-6C36-2F4F-97AF-7FD3892E5C36}">
+          <p14:sldIdLst>
+            <p14:sldId id="272"/>
+            <p14:sldId id="273"/>
+            <p14:sldId id="282"/>
+            <p14:sldId id="283"/>
+            <p14:sldId id="359"/>
+            <p14:sldId id="287"/>
+            <p14:sldId id="286"/>
+            <p14:sldId id="358"/>
+            <p14:sldId id="284"/>
+            <p14:sldId id="288"/>
+            <p14:sldId id="285"/>
+            <p14:sldId id="279"/>
+            <p14:sldId id="298"/>
+            <p14:sldId id="299"/>
+            <p14:sldId id="300"/>
+            <p14:sldId id="280"/>
+            <p14:sldId id="296"/>
+            <p14:sldId id="295"/>
+            <p14:sldId id="294"/>
+            <p14:sldId id="297"/>
+            <p14:sldId id="281"/>
+            <p14:sldId id="289"/>
+            <p14:sldId id="290"/>
+            <p14:sldId id="291"/>
+            <p14:sldId id="292"/>
+            <p14:sldId id="293"/>
+          </p14:sldIdLst>
+        </p14:section>
+        <p14:section name="Programación Orientada a Objetos" id="{8D85F764-A849-B744-B189-B25623491E37}">
+          <p14:sldIdLst>
+            <p14:sldId id="301"/>
+          </p14:sldIdLst>
+        </p14:section>
+        <p14:section name="Introducción" id="{BA99542B-4FED-3C41-996B-EA6CBC7A674B}">
+          <p14:sldIdLst>
+            <p14:sldId id="302"/>
+            <p14:sldId id="317"/>
+            <p14:sldId id="325"/>
+            <p14:sldId id="326"/>
+            <p14:sldId id="327"/>
+            <p14:sldId id="318"/>
+            <p14:sldId id="328"/>
+            <p14:sldId id="329"/>
+            <p14:sldId id="330"/>
+            <p14:sldId id="331"/>
+          </p14:sldIdLst>
+        </p14:section>
+        <p14:section name="Pilares" id="{A3B21CBD-64EB-8449-82D6-67F4686C9435}">
+          <p14:sldIdLst>
+            <p14:sldId id="303"/>
+            <p14:sldId id="332"/>
+            <p14:sldId id="334"/>
+            <p14:sldId id="337"/>
+            <p14:sldId id="338"/>
+            <p14:sldId id="347"/>
+            <p14:sldId id="348"/>
+            <p14:sldId id="336"/>
+            <p14:sldId id="333"/>
+            <p14:sldId id="342"/>
+            <p14:sldId id="339"/>
+            <p14:sldId id="343"/>
+            <p14:sldId id="340"/>
+            <p14:sldId id="344"/>
+            <p14:sldId id="341"/>
+            <p14:sldId id="345"/>
+          </p14:sldIdLst>
+        </p14:section>
+        <p14:section name="Siguientes pasos" id="{180A8EA5-7A38-B744-AB76-D30977A51972}">
+          <p14:sldIdLst>
+            <p14:sldId id="304"/>
+            <p14:sldId id="306"/>
+            <p14:sldId id="307"/>
+            <p14:sldId id="324"/>
+            <p14:sldId id="305"/>
+            <p14:sldId id="323"/>
+            <p14:sldId id="309"/>
+            <p14:sldId id="308"/>
+            <p14:sldId id="310"/>
+            <p14:sldId id="311"/>
+            <p14:sldId id="312"/>
+            <p14:sldId id="313"/>
+            <p14:sldId id="335"/>
+            <p14:sldId id="350"/>
+            <p14:sldId id="351"/>
+            <p14:sldId id="352"/>
+            <p14:sldId id="353"/>
+            <p14:sldId id="354"/>
+            <p14:sldId id="355"/>
+            <p14:sldId id="346"/>
+          </p14:sldIdLst>
+        </p14:section>
+        <p14:section name="Conclusión" id="{304BDCE4-47FE-6540-9532-38751914A6A9}">
+          <p14:sldIdLst>
+            <p14:sldId id="320"/>
+            <p14:sldId id="356"/>
+            <p14:sldId id="322"/>
+            <p14:sldId id="349"/>
+            <p14:sldId id="357"/>
+            <p14:sldId id="319"/>
+            <p14:sldId id="321"/>
+          </p14:sldIdLst>
+        </p14:section>
+      </p14:sectionLst>
+    </p:ext>
+  </p:extLst>
 </p:presentation>
 </file>
 

</xml_diff>